<commit_message>
Changing Materials a bit
</commit_message>
<xml_diff>
--- a/Workshop_Slides/Eagle CAD/Eagle CAD Workshop (2).pptx
+++ b/Workshop_Slides/Eagle CAD/Eagle CAD Workshop (2).pptx
@@ -9,6 +9,8 @@
     <p:sldId id="257" r:id="rId3"/>
     <p:sldId id="258" r:id="rId4"/>
     <p:sldId id="259" r:id="rId5"/>
+    <p:sldId id="260" r:id="rId6"/>
+    <p:sldId id="261" r:id="rId7"/>
   </p:sldIdLst>
   <p:sldSz cx="9144000" cy="6858000" type="screen4x3"/>
   <p:notesSz cx="6858000" cy="9144000"/>
@@ -317,7 +319,7 @@
           <a:p>
             <a:fld id="{B3B53DAC-3A6D-4270-B5CE-9B660B940AF3}" type="datetimeFigureOut">
               <a:rPr lang="en-US" smtClean="0"/>
-              <a:t>8/31/2017</a:t>
+              <a:t>9/2/2017</a:t>
             </a:fld>
             <a:endParaRPr lang="en-US"/>
           </a:p>
@@ -511,7 +513,7 @@
           <a:p>
             <a:fld id="{B3B53DAC-3A6D-4270-B5CE-9B660B940AF3}" type="datetimeFigureOut">
               <a:rPr lang="en-US" smtClean="0"/>
-              <a:t>8/31/2017</a:t>
+              <a:t>9/2/2017</a:t>
             </a:fld>
             <a:endParaRPr lang="en-US"/>
           </a:p>
@@ -699,7 +701,7 @@
           <a:p>
             <a:fld id="{B3B53DAC-3A6D-4270-B5CE-9B660B940AF3}" type="datetimeFigureOut">
               <a:rPr lang="en-US" smtClean="0"/>
-              <a:t>8/31/2017</a:t>
+              <a:t>9/2/2017</a:t>
             </a:fld>
             <a:endParaRPr lang="en-US"/>
           </a:p>
@@ -928,7 +930,7 @@
           <a:p>
             <a:fld id="{B3B53DAC-3A6D-4270-B5CE-9B660B940AF3}" type="datetimeFigureOut">
               <a:rPr lang="en-US" smtClean="0"/>
-              <a:t>8/31/2017</a:t>
+              <a:t>9/2/2017</a:t>
             </a:fld>
             <a:endParaRPr lang="en-US"/>
           </a:p>
@@ -1209,7 +1211,7 @@
           <a:p>
             <a:fld id="{B3B53DAC-3A6D-4270-B5CE-9B660B940AF3}" type="datetimeFigureOut">
               <a:rPr lang="en-US" smtClean="0"/>
-              <a:t>8/31/2017</a:t>
+              <a:t>9/2/2017</a:t>
             </a:fld>
             <a:endParaRPr lang="en-US"/>
           </a:p>
@@ -1497,7 +1499,7 @@
           <a:p>
             <a:fld id="{B3B53DAC-3A6D-4270-B5CE-9B660B940AF3}" type="datetimeFigureOut">
               <a:rPr lang="en-US" smtClean="0"/>
-              <a:t>8/31/2017</a:t>
+              <a:t>9/2/2017</a:t>
             </a:fld>
             <a:endParaRPr lang="en-US"/>
           </a:p>
@@ -2051,7 +2053,7 @@
           <a:p>
             <a:fld id="{B3B53DAC-3A6D-4270-B5CE-9B660B940AF3}" type="datetimeFigureOut">
               <a:rPr lang="en-US" smtClean="0"/>
-              <a:t>8/31/2017</a:t>
+              <a:t>9/2/2017</a:t>
             </a:fld>
             <a:endParaRPr lang="en-US"/>
           </a:p>
@@ -2182,7 +2184,7 @@
           <a:p>
             <a:fld id="{B3B53DAC-3A6D-4270-B5CE-9B660B940AF3}" type="datetimeFigureOut">
               <a:rPr lang="en-US" smtClean="0"/>
-              <a:t>8/31/2017</a:t>
+              <a:t>9/2/2017</a:t>
             </a:fld>
             <a:endParaRPr lang="en-US"/>
           </a:p>
@@ -2332,7 +2334,7 @@
           <a:p>
             <a:fld id="{B3B53DAC-3A6D-4270-B5CE-9B660B940AF3}" type="datetimeFigureOut">
               <a:rPr lang="en-US" smtClean="0"/>
-              <a:t>8/31/2017</a:t>
+              <a:t>9/2/2017</a:t>
             </a:fld>
             <a:endParaRPr lang="en-US"/>
           </a:p>
@@ -2653,7 +2655,7 @@
           <a:p>
             <a:fld id="{B3B53DAC-3A6D-4270-B5CE-9B660B940AF3}" type="datetimeFigureOut">
               <a:rPr lang="en-US" smtClean="0"/>
-              <a:t>8/31/2017</a:t>
+              <a:t>9/2/2017</a:t>
             </a:fld>
             <a:endParaRPr lang="en-US"/>
           </a:p>
@@ -2950,7 +2952,7 @@
           <a:p>
             <a:fld id="{B3B53DAC-3A6D-4270-B5CE-9B660B940AF3}" type="datetimeFigureOut">
               <a:rPr lang="en-US" smtClean="0"/>
-              <a:t>8/31/2017</a:t>
+              <a:t>9/2/2017</a:t>
             </a:fld>
             <a:endParaRPr lang="en-US"/>
           </a:p>
@@ -3195,7 +3197,7 @@
           <a:p>
             <a:fld id="{B3B53DAC-3A6D-4270-B5CE-9B660B940AF3}" type="datetimeFigureOut">
               <a:rPr lang="en-US" smtClean="0"/>
-              <a:t>8/31/2017</a:t>
+              <a:t>9/2/2017</a:t>
             </a:fld>
             <a:endParaRPr lang="en-US"/>
           </a:p>
@@ -3723,11 +3725,8 @@
           <a:p>
             <a:r>
               <a:rPr lang="en-US" dirty="0" smtClean="0"/>
-              <a:t>Passive Components</a:t>
-            </a:r>
-            <a:br>
-              <a:rPr lang="en-US" dirty="0" smtClean="0"/>
-            </a:br>
+              <a:t>How to Read: Diodes</a:t>
+            </a:r>
             <a:endParaRPr lang="en-US" dirty="0"/>
           </a:p>
         </p:txBody>
@@ -3786,218 +3785,58 @@
           <a:p>
             <a:r>
               <a:rPr lang="en-US" dirty="0" smtClean="0"/>
-              <a:t>Resistors</a:t>
+              <a:t>Diodes</a:t>
             </a:r>
             <a:endParaRPr lang="en-US" dirty="0"/>
           </a:p>
         </p:txBody>
       </p:sp>
-      <mc:AlternateContent xmlns:mc="http://schemas.openxmlformats.org/markup-compatibility/2006" xmlns:a14="http://schemas.microsoft.com/office/drawing/2010/main">
-        <mc:Choice Requires="a14">
-          <p:sp>
-            <p:nvSpPr>
-              <p:cNvPr id="3" name="Content Placeholder 2"/>
-              <p:cNvSpPr>
-                <a:spLocks noGrp="1"/>
-              </p:cNvSpPr>
-              <p:nvPr>
-                <p:ph idx="1"/>
-              </p:nvPr>
-            </p:nvSpPr>
-            <p:spPr/>
-            <p:txBody>
-              <a:bodyPr/>
-              <a:lstStyle/>
-              <a:p>
-                <a:r>
-                  <a:rPr lang="en-US" dirty="0" smtClean="0"/>
-                  <a:t>Anything that limits current</a:t>
-                </a:r>
-              </a:p>
-              <a:p>
-                <a14:m>
-                  <m:oMath xmlns:m="http://schemas.openxmlformats.org/officeDocument/2006/math">
-                    <m:r>
-                      <a:rPr lang="en-US" i="1" dirty="0" smtClean="0">
-                        <a:latin typeface="Cambria Math"/>
-                      </a:rPr>
-                      <m:t>𝑉</m:t>
-                    </m:r>
-                    <m:r>
-                      <a:rPr lang="en-US" i="1" dirty="0" smtClean="0">
-                        <a:latin typeface="Cambria Math"/>
-                      </a:rPr>
-                      <m:t>=</m:t>
-                    </m:r>
-                    <m:r>
-                      <a:rPr lang="en-US" i="1" dirty="0" smtClean="0">
-                        <a:latin typeface="Cambria Math"/>
-                      </a:rPr>
-                      <m:t>𝐼𝑅</m:t>
-                    </m:r>
-                  </m:oMath>
-                </a14:m>
-                <a:r>
-                  <a:rPr lang="en-US" dirty="0" smtClean="0"/>
-                  <a:t>, </a:t>
-                </a:r>
-                <a14:m>
-                  <m:oMath xmlns:m="http://schemas.openxmlformats.org/officeDocument/2006/math">
-                    <m:r>
-                      <a:rPr lang="en-US" i="1" dirty="0" smtClean="0">
-                        <a:latin typeface="Cambria Math"/>
-                      </a:rPr>
-                      <m:t>𝑃</m:t>
-                    </m:r>
-                    <m:r>
-                      <a:rPr lang="en-US" i="1" dirty="0" smtClean="0">
-                        <a:latin typeface="Cambria Math"/>
-                      </a:rPr>
-                      <m:t>=</m:t>
-                    </m:r>
-                    <m:r>
-                      <a:rPr lang="en-US" i="1" dirty="0" smtClean="0">
-                        <a:latin typeface="Cambria Math"/>
-                      </a:rPr>
-                      <m:t>𝐼𝑉</m:t>
-                    </m:r>
-                  </m:oMath>
-                </a14:m>
-                <a:r>
-                  <a:rPr lang="en-US" dirty="0" smtClean="0"/>
-                  <a:t> or </a:t>
-                </a:r>
-                <a14:m>
-                  <m:oMath xmlns:m="http://schemas.openxmlformats.org/officeDocument/2006/math">
-                    <m:r>
-                      <a:rPr lang="en-US" b="0" i="1" smtClean="0">
-                        <a:latin typeface="Cambria Math"/>
-                      </a:rPr>
-                      <m:t>𝑃</m:t>
-                    </m:r>
-                    <m:r>
-                      <a:rPr lang="en-US" b="0" i="1" smtClean="0">
-                        <a:latin typeface="Cambria Math"/>
-                      </a:rPr>
-                      <m:t>=</m:t>
-                    </m:r>
-                    <m:sSup>
-                      <m:sSupPr>
-                        <m:ctrlPr>
-                          <a:rPr lang="en-US" b="0" i="1" smtClean="0">
-                            <a:latin typeface="Cambria Math"/>
-                          </a:rPr>
-                        </m:ctrlPr>
-                      </m:sSupPr>
-                      <m:e>
-                        <m:r>
-                          <a:rPr lang="en-US" b="0" i="1" smtClean="0">
-                            <a:latin typeface="Cambria Math"/>
-                          </a:rPr>
-                          <m:t>𝐼</m:t>
-                        </m:r>
-                      </m:e>
-                      <m:sup>
-                        <m:r>
-                          <a:rPr lang="en-US" b="0" i="1" smtClean="0">
-                            <a:latin typeface="Cambria Math"/>
-                          </a:rPr>
-                          <m:t>2</m:t>
-                        </m:r>
-                      </m:sup>
-                    </m:sSup>
-                    <m:r>
-                      <a:rPr lang="en-US" b="0" i="1" smtClean="0">
-                        <a:latin typeface="Cambria Math"/>
-                      </a:rPr>
-                      <m:t>𝑅</m:t>
-                    </m:r>
-                  </m:oMath>
-                </a14:m>
-                <a:endParaRPr lang="en-US" dirty="0" smtClean="0"/>
-              </a:p>
-              <a:p>
-                <a:r>
-                  <a:rPr lang="en-US" dirty="0" smtClean="0"/>
-                  <a:t>Watch for power rating!</a:t>
-                </a:r>
-              </a:p>
-              <a:p>
-                <a:r>
-                  <a:rPr lang="en-US" dirty="0" smtClean="0"/>
-                  <a:t>Resistance, Tolerance, Power, and Composition</a:t>
-                </a:r>
-              </a:p>
-              <a:p>
-                <a:pPr lvl="1"/>
-                <a:r>
-                  <a:rPr lang="en-US" dirty="0" smtClean="0"/>
-                  <a:t>Resistance: Color coded</a:t>
-                </a:r>
-              </a:p>
-              <a:p>
-                <a:pPr lvl="1"/>
-                <a:r>
-                  <a:rPr lang="en-US" dirty="0" smtClean="0"/>
-                  <a:t>Tolerance: ±5%, etc.</a:t>
-                </a:r>
-              </a:p>
-              <a:p>
-                <a:pPr lvl="1"/>
-                <a:r>
-                  <a:rPr lang="en-US" dirty="0" smtClean="0"/>
-                  <a:t>Power: 1/4W, 0.25W, etc.</a:t>
-                </a:r>
-              </a:p>
-              <a:p>
-                <a:pPr lvl="1"/>
-                <a:r>
-                  <a:rPr lang="en-US" dirty="0" smtClean="0"/>
-                  <a:t>Composition: Metal film, carbon film, etc.</a:t>
-                </a:r>
-                <a:endParaRPr lang="en-US" dirty="0"/>
-              </a:p>
-            </p:txBody>
-          </p:sp>
-        </mc:Choice>
-        <mc:Fallback xmlns="">
-          <p:sp>
-            <p:nvSpPr>
-              <p:cNvPr id="3" name="Content Placeholder 2"/>
-              <p:cNvSpPr>
-                <a:spLocks noGrp="1" noRot="1" noChangeAspect="1" noMove="1" noResize="1" noEditPoints="1" noAdjustHandles="1" noChangeArrowheads="1" noChangeShapeType="1" noTextEdit="1"/>
-              </p:cNvSpPr>
-              <p:nvPr>
-                <p:ph idx="1"/>
-              </p:nvPr>
-            </p:nvSpPr>
-            <p:spPr>
-              <a:blipFill rotWithShape="1">
-                <a:blip r:embed="rId2"/>
-                <a:stretch>
-                  <a:fillRect l="-741" t="-1884"/>
-                </a:stretch>
-              </a:blipFill>
-            </p:spPr>
-            <p:txBody>
-              <a:bodyPr/>
-              <a:lstStyle/>
-              <a:p>
-                <a:r>
-                  <a:rPr lang="en-US">
-                    <a:noFill/>
-                  </a:rPr>
-                  <a:t> </a:t>
-                </a:r>
-              </a:p>
-            </p:txBody>
-          </p:sp>
-        </mc:Fallback>
-      </mc:AlternateContent>
+      <p:sp>
+        <p:nvSpPr>
+          <p:cNvPr id="3" name="Content Placeholder 2"/>
+          <p:cNvSpPr>
+            <a:spLocks noGrp="1"/>
+          </p:cNvSpPr>
+          <p:nvPr>
+            <p:ph idx="1"/>
+          </p:nvPr>
+        </p:nvSpPr>
+        <p:spPr/>
+        <p:txBody>
+          <a:bodyPr/>
+          <a:lstStyle/>
+          <a:p>
+            <a:r>
+              <a:rPr lang="en-US" dirty="0" smtClean="0"/>
+              <a:t>General Purpose</a:t>
+            </a:r>
+          </a:p>
+          <a:p>
+            <a:r>
+              <a:rPr lang="en-US" dirty="0" smtClean="0"/>
+              <a:t>LED</a:t>
+            </a:r>
+          </a:p>
+          <a:p>
+            <a:r>
+              <a:rPr lang="en-US" dirty="0" err="1" smtClean="0"/>
+              <a:t>Schottky</a:t>
+            </a:r>
+            <a:endParaRPr lang="en-US" dirty="0" smtClean="0"/>
+          </a:p>
+          <a:p>
+            <a:r>
+              <a:rPr lang="en-US" dirty="0" smtClean="0"/>
+              <a:t>Zener</a:t>
+            </a:r>
+            <a:endParaRPr lang="en-US" dirty="0"/>
+          </a:p>
+        </p:txBody>
+      </p:sp>
     </p:spTree>
     <p:extLst>
       <p:ext uri="{BB962C8B-B14F-4D97-AF65-F5344CB8AC3E}">
-        <p14:creationId xmlns:p14="http://schemas.microsoft.com/office/powerpoint/2010/main" val="2843198710"/>
+        <p14:creationId xmlns:p14="http://schemas.microsoft.com/office/powerpoint/2010/main" val="3961479155"/>
       </p:ext>
     </p:extLst>
   </p:cSld>
@@ -4041,7 +3880,7 @@
           <a:p>
             <a:r>
               <a:rPr lang="en-US" dirty="0" smtClean="0"/>
-              <a:t>Capacitors</a:t>
+              <a:t>Common Specs</a:t>
             </a:r>
             <a:endParaRPr lang="en-US" dirty="0"/>
           </a:p>
@@ -4064,73 +3903,53 @@
           <a:p>
             <a:r>
               <a:rPr lang="en-US" dirty="0" smtClean="0"/>
-              <a:t>Very </a:t>
-            </a:r>
-            <a:r>
-              <a:rPr lang="en-US" dirty="0" err="1" smtClean="0"/>
-              <a:t>very</a:t>
-            </a:r>
+              <a:t>Forward Voltage</a:t>
+            </a:r>
+          </a:p>
+          <a:p>
+            <a:pPr lvl="1"/>
             <a:r>
               <a:rPr lang="en-US" dirty="0" smtClean="0"/>
-              <a:t> </a:t>
-            </a:r>
-            <a:r>
-              <a:rPr lang="en-US" smtClean="0"/>
-              <a:t>tiny </a:t>
-            </a:r>
-            <a:r>
-              <a:rPr lang="en-US" smtClean="0"/>
-              <a:t>battery</a:t>
-            </a:r>
-            <a:endParaRPr lang="en-US" dirty="0"/>
-          </a:p>
-          <a:p>
+              <a:t>Voltage required for electrons to go through</a:t>
+            </a:r>
+          </a:p>
+          <a:p>
+            <a:pPr lvl="1"/>
             <a:r>
               <a:rPr lang="en-US" dirty="0" smtClean="0"/>
-              <a:t>Polarized and Non-polarized</a:t>
+              <a:t>Paired with forward current</a:t>
             </a:r>
           </a:p>
           <a:p>
             <a:pPr lvl="1"/>
             <a:r>
               <a:rPr lang="en-US" dirty="0" smtClean="0"/>
-              <a:t>Check where to connect for polarized!</a:t>
-            </a:r>
-          </a:p>
-          <a:p>
+              <a:t>500mV @ 4A</a:t>
+            </a:r>
+          </a:p>
+          <a:p>
+            <a:pPr lvl="2"/>
             <a:r>
               <a:rPr lang="en-US" dirty="0" smtClean="0"/>
-              <a:t>Ceramic, Tantalum, Aluminum</a:t>
+              <a:t>Means we need at least 500mV (0.5V) to pass 4A</a:t>
             </a:r>
           </a:p>
           <a:p>
             <a:pPr lvl="1"/>
             <a:r>
               <a:rPr lang="en-US" dirty="0" smtClean="0"/>
-              <a:t>Ceramic: All-</a:t>
-            </a:r>
-            <a:r>
-              <a:rPr lang="en-US" dirty="0" err="1" smtClean="0"/>
-              <a:t>arounder</a:t>
-            </a:r>
+              <a:t>Expect voltage drop!</a:t>
+            </a:r>
+          </a:p>
+          <a:p>
+            <a:pPr lvl="2"/>
             <a:r>
               <a:rPr lang="en-US" dirty="0" smtClean="0"/>
-              <a:t>, but bad capacitance.</a:t>
-            </a:r>
-            <a:endParaRPr lang="en-US" dirty="0"/>
+              <a:t>5V 4A -&gt; 4.5V @ 4A</a:t>
+            </a:r>
           </a:p>
           <a:p>
             <a:pPr lvl="1"/>
-            <a:r>
-              <a:rPr lang="en-US" dirty="0" smtClean="0"/>
-              <a:t>Tantalum and Aluminum: Polarized, packed with capacitance, but not so easy to handle.</a:t>
-            </a:r>
-          </a:p>
-          <a:p>
-            <a:r>
-              <a:rPr lang="en-US" dirty="0" smtClean="0"/>
-              <a:t>Capacitance, tolerance, voltage rating</a:t>
-            </a:r>
             <a:endParaRPr lang="en-US" dirty="0"/>
           </a:p>
         </p:txBody>
@@ -4138,7 +3957,7 @@
     </p:spTree>
     <p:extLst>
       <p:ext uri="{BB962C8B-B14F-4D97-AF65-F5344CB8AC3E}">
-        <p14:creationId xmlns:p14="http://schemas.microsoft.com/office/powerpoint/2010/main" val="1273680156"/>
+        <p14:creationId xmlns:p14="http://schemas.microsoft.com/office/powerpoint/2010/main" val="4277966490"/>
       </p:ext>
     </p:extLst>
   </p:cSld>
@@ -4182,7 +4001,15 @@
           <a:p>
             <a:r>
               <a:rPr lang="en-US" dirty="0" smtClean="0"/>
-              <a:t>Inductors</a:t>
+              <a:t>Common Specs (</a:t>
+            </a:r>
+            <a:r>
+              <a:rPr lang="en-US" dirty="0" err="1" smtClean="0"/>
+              <a:t>Cont</a:t>
+            </a:r>
+            <a:r>
+              <a:rPr lang="en-US" dirty="0" smtClean="0"/>
+              <a:t>).</a:t>
             </a:r>
             <a:endParaRPr lang="en-US" dirty="0"/>
           </a:p>
@@ -4205,40 +4032,35 @@
           <a:p>
             <a:r>
               <a:rPr lang="en-US" dirty="0" smtClean="0"/>
-              <a:t>Coil wrapped around core</a:t>
-            </a:r>
-          </a:p>
-          <a:p>
+              <a:t>Reverse Leakage</a:t>
+            </a:r>
+          </a:p>
+          <a:p>
+            <a:pPr lvl="1"/>
             <a:r>
               <a:rPr lang="en-US" dirty="0" smtClean="0"/>
-              <a:t>Inductance, tolerance, current rating, current saturation</a:t>
-            </a:r>
-          </a:p>
-          <a:p>
+              <a:t>Amount of current leaking when backward voltage is applied</a:t>
+            </a:r>
+          </a:p>
+          <a:p>
+            <a:pPr lvl="1"/>
             <a:r>
               <a:rPr lang="en-US" dirty="0" smtClean="0"/>
-              <a:t>Current Saturation!</a:t>
+              <a:t>Paired with reverse voltage</a:t>
             </a:r>
           </a:p>
           <a:p>
             <a:pPr lvl="1"/>
             <a:r>
               <a:rPr lang="en-US" dirty="0" smtClean="0"/>
-              <a:t>Point where inductor CANNOT generate any more electromagnetic field.</a:t>
-            </a:r>
-          </a:p>
-          <a:p>
-            <a:pPr lvl="1"/>
+              <a:t>6nA @ 6.1V</a:t>
+            </a:r>
+          </a:p>
+          <a:p>
+            <a:pPr lvl="2"/>
             <a:r>
               <a:rPr lang="en-US" dirty="0" smtClean="0"/>
-              <a:t>Coil starts to heat up.</a:t>
-            </a:r>
-          </a:p>
-          <a:p>
-            <a:pPr lvl="1"/>
-            <a:r>
-              <a:rPr lang="en-US" dirty="0" smtClean="0"/>
-              <a:t>Still, your coil will physically survive as long as it is less than current rating.</a:t>
+              <a:t>Means 6nA will reserve through diode when 6.1V is applied.</a:t>
             </a:r>
             <a:endParaRPr lang="en-US" dirty="0"/>
           </a:p>
@@ -4247,7 +4069,225 @@
     </p:spTree>
     <p:extLst>
       <p:ext uri="{BB962C8B-B14F-4D97-AF65-F5344CB8AC3E}">
-        <p14:creationId xmlns:p14="http://schemas.microsoft.com/office/powerpoint/2010/main" val="1041155899"/>
+        <p14:creationId xmlns:p14="http://schemas.microsoft.com/office/powerpoint/2010/main" val="953181610"/>
+      </p:ext>
+    </p:extLst>
+  </p:cSld>
+  <p:clrMapOvr>
+    <a:masterClrMapping/>
+  </p:clrMapOvr>
+</p:sld>
+</file>
+
+<file path=ppt/slides/slide5.xml><?xml version="1.0" encoding="utf-8"?>
+<p:sld xmlns:a="http://schemas.openxmlformats.org/drawingml/2006/main" xmlns:r="http://schemas.openxmlformats.org/officeDocument/2006/relationships" xmlns:p="http://schemas.openxmlformats.org/presentationml/2006/main">
+  <p:cSld>
+    <p:spTree>
+      <p:nvGrpSpPr>
+        <p:cNvPr id="1" name=""/>
+        <p:cNvGrpSpPr/>
+        <p:nvPr/>
+      </p:nvGrpSpPr>
+      <p:grpSpPr>
+        <a:xfrm>
+          <a:off x="0" y="0"/>
+          <a:ext cx="0" cy="0"/>
+          <a:chOff x="0" y="0"/>
+          <a:chExt cx="0" cy="0"/>
+        </a:xfrm>
+      </p:grpSpPr>
+      <p:sp>
+        <p:nvSpPr>
+          <p:cNvPr id="2" name="Title 1"/>
+          <p:cNvSpPr>
+            <a:spLocks noGrp="1"/>
+          </p:cNvSpPr>
+          <p:nvPr>
+            <p:ph type="title"/>
+          </p:nvPr>
+        </p:nvSpPr>
+        <p:spPr/>
+        <p:txBody>
+          <a:bodyPr/>
+          <a:lstStyle/>
+          <a:p>
+            <a:r>
+              <a:rPr lang="en-US" dirty="0" err="1" smtClean="0"/>
+              <a:t>Schottky</a:t>
+            </a:r>
+            <a:r>
+              <a:rPr lang="en-US" dirty="0" smtClean="0"/>
+              <a:t> Diode</a:t>
+            </a:r>
+            <a:endParaRPr lang="en-US" dirty="0"/>
+          </a:p>
+        </p:txBody>
+      </p:sp>
+      <p:sp>
+        <p:nvSpPr>
+          <p:cNvPr id="3" name="Content Placeholder 2"/>
+          <p:cNvSpPr>
+            <a:spLocks noGrp="1"/>
+          </p:cNvSpPr>
+          <p:nvPr>
+            <p:ph idx="1"/>
+          </p:nvPr>
+        </p:nvSpPr>
+        <p:spPr/>
+        <p:txBody>
+          <a:bodyPr/>
+          <a:lstStyle/>
+          <a:p>
+            <a:r>
+              <a:rPr lang="en-US" dirty="0" smtClean="0"/>
+              <a:t>Fast recovery time</a:t>
+            </a:r>
+          </a:p>
+          <a:p>
+            <a:pPr lvl="1"/>
+            <a:r>
+              <a:rPr lang="en-US" dirty="0" smtClean="0"/>
+              <a:t>Means diode will take less time to drain out electrons sitting </a:t>
+            </a:r>
+            <a:r>
+              <a:rPr lang="en-US" dirty="0" err="1" smtClean="0"/>
+              <a:t>inbetween</a:t>
+            </a:r>
+            <a:r>
+              <a:rPr lang="en-US" dirty="0" smtClean="0"/>
+              <a:t> diode</a:t>
+            </a:r>
+          </a:p>
+          <a:p>
+            <a:r>
+              <a:rPr lang="en-US" dirty="0" smtClean="0"/>
+              <a:t>Small forward voltage</a:t>
+            </a:r>
+          </a:p>
+          <a:p>
+            <a:pPr lvl="1"/>
+            <a:r>
+              <a:rPr lang="en-US" dirty="0" smtClean="0"/>
+              <a:t>Ideal for high-efficiency circuit (</a:t>
+            </a:r>
+            <a:r>
+              <a:rPr lang="en-US" dirty="0" err="1" smtClean="0"/>
+              <a:t>ie</a:t>
+            </a:r>
+            <a:r>
+              <a:rPr lang="en-US" dirty="0" smtClean="0"/>
+              <a:t>. Solar Cells)</a:t>
+            </a:r>
+            <a:endParaRPr lang="en-US" dirty="0"/>
+          </a:p>
+        </p:txBody>
+      </p:sp>
+    </p:spTree>
+    <p:extLst>
+      <p:ext uri="{BB962C8B-B14F-4D97-AF65-F5344CB8AC3E}">
+        <p14:creationId xmlns:p14="http://schemas.microsoft.com/office/powerpoint/2010/main" val="3657732175"/>
+      </p:ext>
+    </p:extLst>
+  </p:cSld>
+  <p:clrMapOvr>
+    <a:masterClrMapping/>
+  </p:clrMapOvr>
+</p:sld>
+</file>
+
+<file path=ppt/slides/slide6.xml><?xml version="1.0" encoding="utf-8"?>
+<p:sld xmlns:a="http://schemas.openxmlformats.org/drawingml/2006/main" xmlns:r="http://schemas.openxmlformats.org/officeDocument/2006/relationships" xmlns:p="http://schemas.openxmlformats.org/presentationml/2006/main">
+  <p:cSld>
+    <p:spTree>
+      <p:nvGrpSpPr>
+        <p:cNvPr id="1" name=""/>
+        <p:cNvGrpSpPr/>
+        <p:nvPr/>
+      </p:nvGrpSpPr>
+      <p:grpSpPr>
+        <a:xfrm>
+          <a:off x="0" y="0"/>
+          <a:ext cx="0" cy="0"/>
+          <a:chOff x="0" y="0"/>
+          <a:chExt cx="0" cy="0"/>
+        </a:xfrm>
+      </p:grpSpPr>
+      <p:sp>
+        <p:nvSpPr>
+          <p:cNvPr id="2" name="Title 1"/>
+          <p:cNvSpPr>
+            <a:spLocks noGrp="1"/>
+          </p:cNvSpPr>
+          <p:nvPr>
+            <p:ph type="title"/>
+          </p:nvPr>
+        </p:nvSpPr>
+        <p:spPr/>
+        <p:txBody>
+          <a:bodyPr/>
+          <a:lstStyle/>
+          <a:p>
+            <a:r>
+              <a:rPr lang="en-US" dirty="0" smtClean="0"/>
+              <a:t>Zener Diodes</a:t>
+            </a:r>
+            <a:endParaRPr lang="en-US" dirty="0"/>
+          </a:p>
+        </p:txBody>
+      </p:sp>
+      <p:sp>
+        <p:nvSpPr>
+          <p:cNvPr id="3" name="Content Placeholder 2"/>
+          <p:cNvSpPr>
+            <a:spLocks noGrp="1"/>
+          </p:cNvSpPr>
+          <p:nvPr>
+            <p:ph idx="1"/>
+          </p:nvPr>
+        </p:nvSpPr>
+        <p:spPr/>
+        <p:txBody>
+          <a:bodyPr/>
+          <a:lstStyle/>
+          <a:p>
+            <a:r>
+              <a:rPr lang="en-US" dirty="0" smtClean="0"/>
+              <a:t>Usually used as intentional reverse current conductor</a:t>
+            </a:r>
+          </a:p>
+          <a:p>
+            <a:r>
+              <a:rPr lang="en-US" dirty="0" smtClean="0"/>
+              <a:t>Has very precise breakdown voltage</a:t>
+            </a:r>
+          </a:p>
+          <a:p>
+            <a:pPr lvl="1"/>
+            <a:r>
+              <a:rPr lang="en-US" dirty="0" smtClean="0"/>
+              <a:t>Reverse Voltage</a:t>
+            </a:r>
+          </a:p>
+          <a:p>
+            <a:pPr lvl="1"/>
+            <a:r>
+              <a:rPr lang="en-US" dirty="0" smtClean="0"/>
+              <a:t>For Zener diodes, its called Zener Voltage</a:t>
+            </a:r>
+          </a:p>
+          <a:p>
+            <a:r>
+              <a:rPr lang="en-US" dirty="0" smtClean="0"/>
+              <a:t>Using its precise breakdown voltage, it is used as voltage reference.</a:t>
+            </a:r>
+            <a:endParaRPr lang="en-US" dirty="0"/>
+          </a:p>
+        </p:txBody>
+      </p:sp>
+    </p:spTree>
+    <p:extLst>
+      <p:ext uri="{BB962C8B-B14F-4D97-AF65-F5344CB8AC3E}">
+        <p14:creationId xmlns:p14="http://schemas.microsoft.com/office/powerpoint/2010/main" val="2444124560"/>
       </p:ext>
     </p:extLst>
   </p:cSld>

</xml_diff>